<commit_message>
Updated drafts of DocumentDB and Azure SQL modules
</commit_message>
<xml_diff>
--- a/Data/Azure DocumentDB/Session 1 - Introduction and Slides/Azure DocumentDB.pptx
+++ b/Data/Azure DocumentDB/Session 1 - Introduction and Slides/Azure DocumentDB.pptx
@@ -223,7 +223,7 @@
           <a:p>
             <a:fld id="{49B60EF2-7028-489F-85D8-FE86CD7CF2A0}" type="datetimeFigureOut">
               <a:rPr lang="en-US" smtClean="0"/>
-              <a:t>10/9/2016</a:t>
+              <a:t>9/30/2016</a:t>
             </a:fld>
             <a:endParaRPr lang="en-US"/>
           </a:p>
@@ -2193,7 +2193,7 @@
           <a:p>
             <a:fld id="{0459C166-16D3-4A25-A2F8-C51E0E346B22}" type="datetimeFigureOut">
               <a:rPr lang="en-US" smtClean="0"/>
-              <a:t>10/9/2016</a:t>
+              <a:t>9/30/2016</a:t>
             </a:fld>
             <a:endParaRPr lang="en-US"/>
           </a:p>
@@ -2288,7 +2288,7 @@
           <a:p>
             <a:fld id="{0459C166-16D3-4A25-A2F8-C51E0E346B22}" type="datetimeFigureOut">
               <a:rPr lang="en-US" smtClean="0"/>
-              <a:t>10/9/2016</a:t>
+              <a:t>9/30/2016</a:t>
             </a:fld>
             <a:endParaRPr lang="en-US"/>
           </a:p>
@@ -2563,7 +2563,7 @@
           <a:p>
             <a:fld id="{0459C166-16D3-4A25-A2F8-C51E0E346B22}" type="datetimeFigureOut">
               <a:rPr lang="en-US" smtClean="0"/>
-              <a:t>10/9/2016</a:t>
+              <a:t>9/30/2016</a:t>
             </a:fld>
             <a:endParaRPr lang="en-US"/>
           </a:p>
@@ -2815,7 +2815,7 @@
           <a:p>
             <a:fld id="{0459C166-16D3-4A25-A2F8-C51E0E346B22}" type="datetimeFigureOut">
               <a:rPr lang="en-US" smtClean="0"/>
-              <a:t>10/9/2016</a:t>
+              <a:t>9/30/2016</a:t>
             </a:fld>
             <a:endParaRPr lang="en-US"/>
           </a:p>
@@ -2983,7 +2983,7 @@
           <a:p>
             <a:fld id="{0459C166-16D3-4A25-A2F8-C51E0E346B22}" type="datetimeFigureOut">
               <a:rPr lang="en-US" smtClean="0"/>
-              <a:t>10/9/2016</a:t>
+              <a:t>9/30/2016</a:t>
             </a:fld>
             <a:endParaRPr lang="en-US"/>
           </a:p>
@@ -3161,7 +3161,7 @@
           <a:p>
             <a:fld id="{0459C166-16D3-4A25-A2F8-C51E0E346B22}" type="datetimeFigureOut">
               <a:rPr lang="en-US" smtClean="0"/>
-              <a:t>10/9/2016</a:t>
+              <a:t>9/30/2016</a:t>
             </a:fld>
             <a:endParaRPr lang="en-US"/>
           </a:p>
@@ -5066,7 +5066,7 @@
           <a:p>
             <a:fld id="{0459C166-16D3-4A25-A2F8-C51E0E346B22}" type="datetimeFigureOut">
               <a:rPr lang="en-US" smtClean="0"/>
-              <a:t>10/9/2016</a:t>
+              <a:t>9/30/2016</a:t>
             </a:fld>
             <a:endParaRPr lang="en-US"/>
           </a:p>
@@ -10630,7 +10630,7 @@
             <a:fld id="{0459C166-16D3-4A25-A2F8-C51E0E346B22}" type="datetimeFigureOut">
               <a:rPr lang="en-US" smtClean="0"/>
               <a:pPr/>
-              <a:t>10/9/2016</a:t>
+              <a:t>9/30/2016</a:t>
             </a:fld>
             <a:endParaRPr lang="en-US"/>
           </a:p>
@@ -14551,7 +14551,7 @@
           <a:p>
             <a:fld id="{0459C166-16D3-4A25-A2F8-C51E0E346B22}" type="datetimeFigureOut">
               <a:rPr lang="en-US" smtClean="0"/>
-              <a:t>10/9/2016</a:t>
+              <a:t>9/30/2016</a:t>
             </a:fld>
             <a:endParaRPr lang="en-US"/>
           </a:p>
@@ -14915,7 +14915,7 @@
           <a:p>
             <a:fld id="{0459C166-16D3-4A25-A2F8-C51E0E346B22}" type="datetimeFigureOut">
               <a:rPr lang="en-US" smtClean="0"/>
-              <a:t>10/9/2016</a:t>
+              <a:t>9/30/2016</a:t>
             </a:fld>
             <a:endParaRPr lang="en-US"/>
           </a:p>
@@ -15032,7 +15032,7 @@
           <a:p>
             <a:fld id="{0459C166-16D3-4A25-A2F8-C51E0E346B22}" type="datetimeFigureOut">
               <a:rPr lang="en-US" smtClean="0"/>
-              <a:t>10/9/2016</a:t>
+              <a:t>9/30/2016</a:t>
             </a:fld>
             <a:endParaRPr lang="en-US"/>
           </a:p>
@@ -15243,7 +15243,7 @@
           <a:p>
             <a:fld id="{0459C166-16D3-4A25-A2F8-C51E0E346B22}" type="datetimeFigureOut">
               <a:rPr lang="en-US" smtClean="0"/>
-              <a:t>10/9/2016</a:t>
+              <a:t>9/30/2016</a:t>
             </a:fld>
             <a:endParaRPr lang="en-US"/>
           </a:p>
@@ -17170,7 +17170,7 @@
           <p:nvPr/>
         </p:nvPicPr>
         <p:blipFill>
-          <a:blip r:embed="rId4" cstate="print">
+          <a:blip r:embed="rId4">
             <a:extLst>
               <a:ext uri="{28A0092B-C50C-407E-A947-70E740481C1C}">
                 <a14:useLocalDpi xmlns:a14="http://schemas.microsoft.com/office/drawing/2010/main" val="0"/>
@@ -17657,7 +17657,7 @@
             <p:nvPr/>
           </p:nvPicPr>
           <p:blipFill>
-            <a:blip r:embed="rId3" cstate="print">
+            <a:blip r:embed="rId3">
               <a:extLst>
                 <a:ext uri="{28A0092B-C50C-407E-A947-70E740481C1C}">
                   <a14:useLocalDpi xmlns:a14="http://schemas.microsoft.com/office/drawing/2010/main" val="0"/>

</xml_diff>